<commit_message>
Updated with more deatils
</commit_message>
<xml_diff>
--- a/Kernel_WQs.pptx
+++ b/Kernel_WQs.pptx
@@ -159,6 +159,36 @@
       </a:defRPr>
     </a:lvl9pPr>
   </p:defaultTextStyle>
+  <p:extLst>
+    <p:ext uri="{EFAFB233-063F-42B5-8137-9DF3F51BA10A}">
+      <p15:sldGuideLst xmlns:p15="http://schemas.microsoft.com/office/powerpoint/2012/main">
+        <p15:guide id="1" orient="horz">
+          <p15:clr>
+            <a:srgbClr val="A4A3A4"/>
+          </p15:clr>
+        </p15:guide>
+        <p15:guide id="2" pos="5759">
+          <p15:clr>
+            <a:srgbClr val="A4A3A4"/>
+          </p15:clr>
+        </p15:guide>
+      </p15:sldGuideLst>
+    </p:ext>
+    <p:ext uri="{2D200454-40CA-4A62-9FC3-DE9A4176ACB9}">
+      <p15:notesGuideLst xmlns:p15="http://schemas.microsoft.com/office/powerpoint/2012/main">
+        <p15:guide id="1" orient="horz" pos="2880">
+          <p15:clr>
+            <a:srgbClr val="A4A3A4"/>
+          </p15:clr>
+        </p15:guide>
+        <p15:guide id="2" pos="2160">
+          <p15:clr>
+            <a:srgbClr val="A4A3A4"/>
+          </p15:clr>
+        </p15:guide>
+      </p15:notesGuideLst>
+    </p:ext>
+  </p:extLst>
 </p:presentation>
 </file>
 
@@ -271,7 +301,7 @@
               <a:pPr>
                 <a:defRPr/>
               </a:pPr>
-              <a:t>6/9/2014</a:t>
+              <a:t>12/4/2014</a:t>
             </a:fld>
             <a:endParaRPr lang="en-US"/>
           </a:p>
@@ -8307,8 +8337,8 @@
         </p:nvSpPr>
         <p:spPr>
           <a:xfrm>
-            <a:off x="412721" y="2803719"/>
-            <a:ext cx="7808913" cy="366712"/>
+            <a:off x="412721" y="2014177"/>
+            <a:ext cx="8543992" cy="4395049"/>
           </a:xfrm>
         </p:spPr>
         <p:txBody>
@@ -8323,8 +8353,98 @@
             </a:pPr>
             <a:r>
               <a:rPr lang="en-US" dirty="0"/>
-              <a:t>Kernel Work Queues</a:t>
-            </a:r>
+              <a:t>Kernel Work </a:t>
+            </a:r>
+            <a:r>
+              <a:rPr lang="en-US" dirty="0" smtClean="0"/>
+              <a:t>Queues</a:t>
+            </a:r>
+            <a:br>
+              <a:rPr lang="en-US" dirty="0" smtClean="0"/>
+            </a:br>
+            <a:r>
+              <a:rPr lang="en-US" dirty="0" smtClean="0"/>
+              <a:t/>
+            </a:r>
+            <a:br>
+              <a:rPr lang="en-US" dirty="0" smtClean="0"/>
+            </a:br>
+            <a:r>
+              <a:rPr lang="en-US" dirty="0"/>
+              <a:t/>
+            </a:r>
+            <a:br>
+              <a:rPr lang="en-US" dirty="0"/>
+            </a:br>
+            <a:r>
+              <a:rPr lang="en-US" dirty="0" smtClean="0"/>
+              <a:t/>
+            </a:r>
+            <a:br>
+              <a:rPr lang="en-US" dirty="0" smtClean="0"/>
+            </a:br>
+            <a:r>
+              <a:rPr lang="en-US" dirty="0"/>
+              <a:t/>
+            </a:r>
+            <a:br>
+              <a:rPr lang="en-US" dirty="0"/>
+            </a:br>
+            <a:r>
+              <a:rPr lang="en-US" dirty="0" smtClean="0"/>
+              <a:t/>
+            </a:r>
+            <a:br>
+              <a:rPr lang="en-US" dirty="0" smtClean="0"/>
+            </a:br>
+            <a:r>
+              <a:rPr lang="en-US" dirty="0"/>
+              <a:t/>
+            </a:r>
+            <a:br>
+              <a:rPr lang="en-US" dirty="0"/>
+            </a:br>
+            <a:r>
+              <a:rPr lang="en-US" dirty="0" smtClean="0"/>
+              <a:t/>
+            </a:r>
+            <a:br>
+              <a:rPr lang="en-US" dirty="0" smtClean="0"/>
+            </a:br>
+            <a:r>
+              <a:rPr lang="en-US" dirty="0"/>
+              <a:t/>
+            </a:r>
+            <a:br>
+              <a:rPr lang="en-US" dirty="0"/>
+            </a:br>
+            <a:r>
+              <a:rPr lang="en-US" dirty="0" smtClean="0"/>
+              <a:t>						Arun KS</a:t>
+            </a:r>
+            <a:br>
+              <a:rPr lang="en-US" dirty="0" smtClean="0"/>
+            </a:br>
+            <a:r>
+              <a:rPr lang="en-US" dirty="0"/>
+              <a:t>	</a:t>
+            </a:r>
+            <a:r>
+              <a:rPr lang="en-US" dirty="0" smtClean="0"/>
+              <a:t>					Staff Engineer,</a:t>
+            </a:r>
+            <a:br>
+              <a:rPr lang="en-US" dirty="0" smtClean="0"/>
+            </a:br>
+            <a:r>
+              <a:rPr lang="en-US" dirty="0"/>
+              <a:t>	</a:t>
+            </a:r>
+            <a:r>
+              <a:rPr lang="en-US" dirty="0" smtClean="0"/>
+              <a:t>					Qualcomm	</a:t>
+            </a:r>
+            <a:endParaRPr lang="en-US" dirty="0"/>
           </a:p>
         </p:txBody>
       </p:sp>
@@ -11665,7 +11785,7 @@
         <p:spPr>
           <a:xfrm>
             <a:off x="384047" y="1369377"/>
-            <a:ext cx="8458200" cy="4681045"/>
+            <a:ext cx="8458200" cy="7775975"/>
           </a:xfrm>
         </p:spPr>
         <p:txBody>
@@ -11725,6 +11845,44 @@
                 </a:solidFill>
               </a:rPr>
               <a:t>, no new worker is scheduled. </a:t>
+            </a:r>
+            <a:endParaRPr lang="en-US" dirty="0" smtClean="0">
+              <a:solidFill>
+                <a:schemeClr val="accent1">
+                  <a:lumMod val="40000"/>
+                  <a:lumOff val="60000"/>
+                </a:schemeClr>
+              </a:solidFill>
+            </a:endParaRPr>
+          </a:p>
+          <a:p>
+            <a:pPr lvl="2">
+              <a:buFont typeface="Arial" panose="020B0604020202020204" pitchFamily="34" charset="0"/>
+              <a:buChar char="•"/>
+            </a:pPr>
+            <a:r>
+              <a:rPr lang="en-US" dirty="0">
+                <a:solidFill>
+                  <a:srgbClr val="FF0000"/>
+                </a:solidFill>
+              </a:rPr>
+              <a:t>For </a:t>
+            </a:r>
+            <a:r>
+              <a:rPr lang="en-US" dirty="0" err="1">
+                <a:solidFill>
+                  <a:srgbClr val="FF0000"/>
+                </a:solidFill>
+              </a:rPr>
+              <a:t>eg</a:t>
+            </a:r>
+            <a:r>
+              <a:rPr lang="en-US" dirty="0">
+                <a:solidFill>
+                  <a:srgbClr val="FF0000"/>
+                </a:solidFill>
+              </a:rPr>
+              <a:t> kworker0:1 started working and it sleeps, kwoker0:2 will be scheduled to execute next work. But if kowker0:1 finishes a work, same worker will be used for next pending work item.</a:t>
             </a:r>
           </a:p>
           <a:p>
@@ -12441,6 +12599,55 @@
                       </p:childTnLst>
                     </p:cTn>
                   </p:par>
+                  <p:par>
+                    <p:cTn id="35" fill="hold">
+                      <p:stCondLst>
+                        <p:cond delay="indefinite"/>
+                      </p:stCondLst>
+                      <p:childTnLst>
+                        <p:par>
+                          <p:cTn id="36" fill="hold">
+                            <p:stCondLst>
+                              <p:cond delay="0"/>
+                            </p:stCondLst>
+                            <p:childTnLst>
+                              <p:par>
+                                <p:cTn id="37" presetID="1" presetClass="entr" presetSubtype="0" fill="hold" nodeType="clickEffect">
+                                  <p:stCondLst>
+                                    <p:cond delay="0"/>
+                                  </p:stCondLst>
+                                  <p:childTnLst>
+                                    <p:set>
+                                      <p:cBhvr>
+                                        <p:cTn id="38" dur="1" fill="hold">
+                                          <p:stCondLst>
+                                            <p:cond delay="0"/>
+                                          </p:stCondLst>
+                                        </p:cTn>
+                                        <p:tgtEl>
+                                          <p:spTgt spid="3">
+                                            <p:txEl>
+                                              <p:pRg st="8" end="8"/>
+                                            </p:txEl>
+                                          </p:spTgt>
+                                        </p:tgtEl>
+                                        <p:attrNameLst>
+                                          <p:attrName>style.visibility</p:attrName>
+                                        </p:attrNameLst>
+                                      </p:cBhvr>
+                                      <p:to>
+                                        <p:strVal val="visible"/>
+                                      </p:to>
+                                    </p:set>
+                                  </p:childTnLst>
+                                </p:cTn>
+                              </p:par>
+                            </p:childTnLst>
+                          </p:cTn>
+                        </p:par>
+                      </p:childTnLst>
+                    </p:cTn>
+                  </p:par>
                 </p:childTnLst>
               </p:cTn>
               <p:prevCondLst>
@@ -12549,7 +12756,7 @@
         <p:spPr>
           <a:xfrm>
             <a:off x="384047" y="1369378"/>
-            <a:ext cx="8458200" cy="2819233"/>
+            <a:ext cx="8458200" cy="3782574"/>
           </a:xfrm>
         </p:spPr>
         <p:txBody>
@@ -12608,10 +12815,8 @@
                   </a:schemeClr>
                 </a:solidFill>
               </a:rPr>
-              <a:t>If a work item is executing on a different CPU when queuing is requested, it is always queued on that CPU.</a:t>
-            </a:r>
-          </a:p>
-          <a:p>
+              <a:t>If a work item is executing on a different CPU when queuing is requested, it is always queued on that CPU</a:t>
+            </a:r>
             <a:r>
               <a:rPr lang="en-US" sz="2000" dirty="0" smtClean="0">
                 <a:solidFill>
@@ -12621,6 +12826,75 @@
                   </a:schemeClr>
                 </a:solidFill>
               </a:rPr>
+              <a:t>.</a:t>
+            </a:r>
+          </a:p>
+          <a:p>
+            <a:pPr lvl="1"/>
+            <a:r>
+              <a:rPr lang="en-US" sz="1600" dirty="0" err="1" smtClean="0">
+                <a:solidFill>
+                  <a:srgbClr val="FF0000"/>
+                </a:solidFill>
+              </a:rPr>
+              <a:t>Eg</a:t>
+            </a:r>
+            <a:r>
+              <a:rPr lang="en-US" sz="1600" dirty="0" smtClean="0">
+                <a:solidFill>
+                  <a:srgbClr val="FF0000"/>
+                </a:solidFill>
+              </a:rPr>
+              <a:t>: kworker0:0 is executing a work on </a:t>
+            </a:r>
+            <a:r>
+              <a:rPr lang="en-US" sz="1600" dirty="0" err="1" smtClean="0">
+                <a:solidFill>
+                  <a:srgbClr val="FF0000"/>
+                </a:solidFill>
+              </a:rPr>
+              <a:t>cpu</a:t>
+            </a:r>
+            <a:r>
+              <a:rPr lang="en-US" sz="1600" dirty="0" smtClean="0">
+                <a:solidFill>
+                  <a:srgbClr val="FF0000"/>
+                </a:solidFill>
+              </a:rPr>
+              <a:t> 0, now when we queue same work from a different </a:t>
+            </a:r>
+            <a:r>
+              <a:rPr lang="en-US" sz="1600" dirty="0" err="1" smtClean="0">
+                <a:solidFill>
+                  <a:srgbClr val="FF0000"/>
+                </a:solidFill>
+              </a:rPr>
+              <a:t>cpu</a:t>
+            </a:r>
+            <a:r>
+              <a:rPr lang="en-US" sz="1600" dirty="0" smtClean="0">
+                <a:solidFill>
+                  <a:srgbClr val="FF0000"/>
+                </a:solidFill>
+              </a:rPr>
+              <a:t>(lets say cpu1), the work get queued on cpu0 and not on cpu1.</a:t>
+            </a:r>
+            <a:endParaRPr lang="en-US" sz="1600" dirty="0" smtClean="0">
+              <a:solidFill>
+                <a:srgbClr val="FF0000"/>
+              </a:solidFill>
+            </a:endParaRPr>
+          </a:p>
+          <a:p>
+            <a:r>
+              <a:rPr lang="en-US" sz="2000" dirty="0" smtClean="0">
+                <a:solidFill>
+                  <a:schemeClr val="accent1">
+                    <a:lumMod val="40000"/>
+                    <a:lumOff val="60000"/>
+                  </a:schemeClr>
+                </a:solidFill>
+              </a:rPr>
               <a:t>This may affect some users negatively.</a:t>
             </a:r>
           </a:p>
@@ -12658,6 +12932,54 @@
               </a:rPr>
               <a:t>.</a:t>
             </a:r>
+          </a:p>
+          <a:p>
+            <a:pPr lvl="1"/>
+            <a:r>
+              <a:rPr lang="en-US" sz="1600" dirty="0" smtClean="0">
+                <a:solidFill>
+                  <a:srgbClr val="FF0000"/>
+                </a:solidFill>
+              </a:rPr>
+              <a:t>In the above </a:t>
+            </a:r>
+            <a:r>
+              <a:rPr lang="en-US" sz="1600" dirty="0" err="1" smtClean="0">
+                <a:solidFill>
+                  <a:srgbClr val="FF0000"/>
+                </a:solidFill>
+              </a:rPr>
+              <a:t>Eg</a:t>
+            </a:r>
+            <a:r>
+              <a:rPr lang="en-US" sz="1600" dirty="0" smtClean="0">
+                <a:solidFill>
+                  <a:srgbClr val="FF0000"/>
+                </a:solidFill>
+              </a:rPr>
+              <a:t>, even if we use </a:t>
+            </a:r>
+            <a:r>
+              <a:rPr lang="en-US" sz="1600" dirty="0" err="1" smtClean="0">
+                <a:solidFill>
+                  <a:srgbClr val="FF0000"/>
+                </a:solidFill>
+              </a:rPr>
+              <a:t>queue_work_on</a:t>
+            </a:r>
+            <a:r>
+              <a:rPr lang="en-US" sz="1600" dirty="0" smtClean="0">
+                <a:solidFill>
+                  <a:srgbClr val="FF0000"/>
+                </a:solidFill>
+              </a:rPr>
+              <a:t>(1, work1), it gets queued in cpu0 to meet the non-reentrant behavior.</a:t>
+            </a:r>
+            <a:endParaRPr lang="en-US" sz="1600" dirty="0" smtClean="0">
+              <a:solidFill>
+                <a:srgbClr val="FF0000"/>
+              </a:solidFill>
+            </a:endParaRPr>
           </a:p>
           <a:p>
             <a:endParaRPr lang="en-US" dirty="0" smtClean="0">
@@ -12923,6 +13245,104 @@
                                           <p:spTgt spid="3">
                                             <p:txEl>
                                               <p:pRg st="3" end="3"/>
+                                            </p:txEl>
+                                          </p:spTgt>
+                                        </p:tgtEl>
+                                        <p:attrNameLst>
+                                          <p:attrName>style.visibility</p:attrName>
+                                        </p:attrNameLst>
+                                      </p:cBhvr>
+                                      <p:to>
+                                        <p:strVal val="visible"/>
+                                      </p:to>
+                                    </p:set>
+                                  </p:childTnLst>
+                                </p:cTn>
+                              </p:par>
+                            </p:childTnLst>
+                          </p:cTn>
+                        </p:par>
+                      </p:childTnLst>
+                    </p:cTn>
+                  </p:par>
+                  <p:par>
+                    <p:cTn id="19" fill="hold">
+                      <p:stCondLst>
+                        <p:cond delay="indefinite"/>
+                      </p:stCondLst>
+                      <p:childTnLst>
+                        <p:par>
+                          <p:cTn id="20" fill="hold">
+                            <p:stCondLst>
+                              <p:cond delay="0"/>
+                            </p:stCondLst>
+                            <p:childTnLst>
+                              <p:par>
+                                <p:cTn id="21" presetID="1" presetClass="entr" presetSubtype="0" fill="hold" nodeType="clickEffect">
+                                  <p:stCondLst>
+                                    <p:cond delay="0"/>
+                                  </p:stCondLst>
+                                  <p:childTnLst>
+                                    <p:set>
+                                      <p:cBhvr>
+                                        <p:cTn id="22" dur="1" fill="hold">
+                                          <p:stCondLst>
+                                            <p:cond delay="0"/>
+                                          </p:stCondLst>
+                                        </p:cTn>
+                                        <p:tgtEl>
+                                          <p:spTgt spid="3">
+                                            <p:txEl>
+                                              <p:pRg st="4" end="4"/>
+                                            </p:txEl>
+                                          </p:spTgt>
+                                        </p:tgtEl>
+                                        <p:attrNameLst>
+                                          <p:attrName>style.visibility</p:attrName>
+                                        </p:attrNameLst>
+                                      </p:cBhvr>
+                                      <p:to>
+                                        <p:strVal val="visible"/>
+                                      </p:to>
+                                    </p:set>
+                                  </p:childTnLst>
+                                </p:cTn>
+                              </p:par>
+                            </p:childTnLst>
+                          </p:cTn>
+                        </p:par>
+                      </p:childTnLst>
+                    </p:cTn>
+                  </p:par>
+                  <p:par>
+                    <p:cTn id="23" fill="hold">
+                      <p:stCondLst>
+                        <p:cond delay="indefinite"/>
+                      </p:stCondLst>
+                      <p:childTnLst>
+                        <p:par>
+                          <p:cTn id="24" fill="hold">
+                            <p:stCondLst>
+                              <p:cond delay="0"/>
+                            </p:stCondLst>
+                            <p:childTnLst>
+                              <p:par>
+                                <p:cTn id="25" presetID="1" presetClass="entr" presetSubtype="0" fill="hold" nodeType="clickEffect">
+                                  <p:stCondLst>
+                                    <p:cond delay="0"/>
+                                  </p:stCondLst>
+                                  <p:childTnLst>
+                                    <p:set>
+                                      <p:cBhvr>
+                                        <p:cTn id="26" dur="1" fill="hold">
+                                          <p:stCondLst>
+                                            <p:cond delay="0"/>
+                                          </p:stCondLst>
+                                        </p:cTn>
+                                        <p:tgtEl>
+                                          <p:spTgt spid="3">
+                                            <p:txEl>
+                                              <p:pRg st="5" end="5"/>
                                             </p:txEl>
                                           </p:spTgt>
                                         </p:tgtEl>
@@ -15055,7 +15475,7 @@
                   </a:schemeClr>
                 </a:solidFill>
               </a:rPr>
-              <a:t>Example</a:t>
+              <a:t>Example - old WQ implementation</a:t>
             </a:r>
             <a:endParaRPr lang="en-US" dirty="0">
               <a:solidFill>
@@ -17081,7 +17501,7 @@
                   </a:schemeClr>
                 </a:solidFill>
               </a:rPr>
-              <a:t>Example</a:t>
+              <a:t>Example – new WQ implementation</a:t>
             </a:r>
             <a:endParaRPr lang="en-US" dirty="0">
               <a:solidFill>
@@ -18571,7 +18991,18 @@
                   </a:schemeClr>
                 </a:solidFill>
               </a:rPr>
-              <a:t> snapshot</a:t>
+              <a:t> </a:t>
+            </a:r>
+            <a:r>
+              <a:rPr lang="en-US" dirty="0" smtClean="0">
+                <a:solidFill>
+                  <a:schemeClr val="accent3">
+                    <a:lumMod val="60000"/>
+                    <a:lumOff val="40000"/>
+                  </a:schemeClr>
+                </a:solidFill>
+              </a:rPr>
+              <a:t>snapshot on a dual core SMP system</a:t>
             </a:r>
             <a:endParaRPr lang="en-US" dirty="0">
               <a:solidFill>
@@ -18597,7 +19028,7 @@
         <p:spPr>
           <a:xfrm>
             <a:off x="426776" y="924997"/>
-            <a:ext cx="8458200" cy="276999"/>
+            <a:ext cx="8458200" cy="5319918"/>
           </a:xfrm>
         </p:spPr>
         <p:txBody>
@@ -18607,6 +19038,339 @@
             <a:pPr marL="341313" lvl="1" indent="0">
               <a:buNone/>
             </a:pPr>
+            <a:endParaRPr lang="en-US" dirty="0" smtClean="0">
+              <a:solidFill>
+                <a:schemeClr val="accent1">
+                  <a:lumMod val="40000"/>
+                  <a:lumOff val="60000"/>
+                </a:schemeClr>
+              </a:solidFill>
+            </a:endParaRPr>
+          </a:p>
+          <a:p>
+            <a:pPr marL="341313" lvl="1" indent="0">
+              <a:buNone/>
+            </a:pPr>
+            <a:endParaRPr lang="en-US" dirty="0">
+              <a:solidFill>
+                <a:schemeClr val="accent1">
+                  <a:lumMod val="40000"/>
+                  <a:lumOff val="60000"/>
+                </a:schemeClr>
+              </a:solidFill>
+            </a:endParaRPr>
+          </a:p>
+          <a:p>
+            <a:pPr marL="341313" lvl="1" indent="0">
+              <a:buNone/>
+            </a:pPr>
+            <a:endParaRPr lang="en-US" dirty="0" smtClean="0">
+              <a:solidFill>
+                <a:schemeClr val="accent1">
+                  <a:lumMod val="40000"/>
+                  <a:lumOff val="60000"/>
+                </a:schemeClr>
+              </a:solidFill>
+            </a:endParaRPr>
+          </a:p>
+          <a:p>
+            <a:pPr marL="341313" lvl="1" indent="0">
+              <a:buNone/>
+            </a:pPr>
+            <a:endParaRPr lang="en-US" dirty="0">
+              <a:solidFill>
+                <a:schemeClr val="accent1">
+                  <a:lumMod val="40000"/>
+                  <a:lumOff val="60000"/>
+                </a:schemeClr>
+              </a:solidFill>
+            </a:endParaRPr>
+          </a:p>
+          <a:p>
+            <a:pPr marL="341313" lvl="1" indent="0">
+              <a:buNone/>
+            </a:pPr>
+            <a:endParaRPr lang="en-US" dirty="0" smtClean="0">
+              <a:solidFill>
+                <a:schemeClr val="accent1">
+                  <a:lumMod val="40000"/>
+                  <a:lumOff val="60000"/>
+                </a:schemeClr>
+              </a:solidFill>
+            </a:endParaRPr>
+          </a:p>
+          <a:p>
+            <a:pPr marL="341313" lvl="1" indent="0">
+              <a:buNone/>
+            </a:pPr>
+            <a:endParaRPr lang="en-US" dirty="0">
+              <a:solidFill>
+                <a:schemeClr val="accent1">
+                  <a:lumMod val="40000"/>
+                  <a:lumOff val="60000"/>
+                </a:schemeClr>
+              </a:solidFill>
+            </a:endParaRPr>
+          </a:p>
+          <a:p>
+            <a:pPr marL="341313" lvl="1" indent="0">
+              <a:buNone/>
+            </a:pPr>
+            <a:endParaRPr lang="en-US" dirty="0" smtClean="0">
+              <a:solidFill>
+                <a:schemeClr val="accent1">
+                  <a:lumMod val="40000"/>
+                  <a:lumOff val="60000"/>
+                </a:schemeClr>
+              </a:solidFill>
+            </a:endParaRPr>
+          </a:p>
+          <a:p>
+            <a:pPr marL="341313" lvl="1" indent="0">
+              <a:buNone/>
+            </a:pPr>
+            <a:endParaRPr lang="en-US" dirty="0">
+              <a:solidFill>
+                <a:schemeClr val="accent1">
+                  <a:lumMod val="40000"/>
+                  <a:lumOff val="60000"/>
+                </a:schemeClr>
+              </a:solidFill>
+            </a:endParaRPr>
+          </a:p>
+          <a:p>
+            <a:pPr marL="341313" lvl="1" indent="0">
+              <a:buNone/>
+            </a:pPr>
+            <a:endParaRPr lang="en-US" dirty="0" smtClean="0">
+              <a:solidFill>
+                <a:schemeClr val="accent1">
+                  <a:lumMod val="40000"/>
+                  <a:lumOff val="60000"/>
+                </a:schemeClr>
+              </a:solidFill>
+            </a:endParaRPr>
+          </a:p>
+          <a:p>
+            <a:pPr marL="341313" lvl="1" indent="0">
+              <a:buNone/>
+            </a:pPr>
+            <a:endParaRPr lang="en-US" dirty="0">
+              <a:solidFill>
+                <a:schemeClr val="accent1">
+                  <a:lumMod val="40000"/>
+                  <a:lumOff val="60000"/>
+                </a:schemeClr>
+              </a:solidFill>
+            </a:endParaRPr>
+          </a:p>
+          <a:p>
+            <a:pPr lvl="1">
+              <a:buFont typeface="Arial" panose="020B0604020202020204" pitchFamily="34" charset="0"/>
+              <a:buChar char="•"/>
+            </a:pPr>
+            <a:r>
+              <a:rPr lang="en-US" dirty="0" err="1" smtClean="0">
+                <a:solidFill>
+                  <a:schemeClr val="accent1">
+                    <a:lumMod val="40000"/>
+                    <a:lumOff val="60000"/>
+                  </a:schemeClr>
+                </a:solidFill>
+              </a:rPr>
+              <a:t>Kworker</a:t>
+            </a:r>
+            <a:r>
+              <a:rPr lang="en-US" dirty="0" smtClean="0">
+                <a:solidFill>
+                  <a:schemeClr val="accent1">
+                    <a:lumMod val="40000"/>
+                    <a:lumOff val="60000"/>
+                  </a:schemeClr>
+                </a:solidFill>
+              </a:rPr>
+              <a:t>/1:2H</a:t>
+            </a:r>
+          </a:p>
+          <a:p>
+            <a:pPr lvl="2">
+              <a:buFont typeface="Arial" panose="020B0604020202020204" pitchFamily="34" charset="0"/>
+              <a:buChar char="•"/>
+            </a:pPr>
+            <a:r>
+              <a:rPr lang="en-US" dirty="0" smtClean="0">
+                <a:solidFill>
+                  <a:schemeClr val="accent1">
+                    <a:lumMod val="40000"/>
+                    <a:lumOff val="60000"/>
+                  </a:schemeClr>
+                </a:solidFill>
+              </a:rPr>
+              <a:t>2</a:t>
+            </a:r>
+            <a:r>
+              <a:rPr lang="en-US" baseline="30000" dirty="0" smtClean="0">
+                <a:solidFill>
+                  <a:schemeClr val="accent1">
+                    <a:lumMod val="40000"/>
+                    <a:lumOff val="60000"/>
+                  </a:schemeClr>
+                </a:solidFill>
+              </a:rPr>
+              <a:t>nd</a:t>
+            </a:r>
+            <a:r>
+              <a:rPr lang="en-US" dirty="0" smtClean="0">
+                <a:solidFill>
+                  <a:schemeClr val="accent1">
+                    <a:lumMod val="40000"/>
+                    <a:lumOff val="60000"/>
+                  </a:schemeClr>
+                </a:solidFill>
+              </a:rPr>
+              <a:t> </a:t>
+            </a:r>
+            <a:r>
+              <a:rPr lang="en-US" dirty="0" err="1" smtClean="0">
+                <a:solidFill>
+                  <a:schemeClr val="accent1">
+                    <a:lumMod val="40000"/>
+                    <a:lumOff val="60000"/>
+                  </a:schemeClr>
+                </a:solidFill>
+              </a:rPr>
+              <a:t>kworker</a:t>
+            </a:r>
+            <a:r>
+              <a:rPr lang="en-US" dirty="0" smtClean="0">
+                <a:solidFill>
+                  <a:schemeClr val="accent1">
+                    <a:lumMod val="40000"/>
+                    <a:lumOff val="60000"/>
+                  </a:schemeClr>
+                </a:solidFill>
+              </a:rPr>
+              <a:t> running on </a:t>
+            </a:r>
+            <a:r>
+              <a:rPr lang="en-US" dirty="0" err="1" smtClean="0">
+                <a:solidFill>
+                  <a:schemeClr val="accent1">
+                    <a:lumMod val="40000"/>
+                    <a:lumOff val="60000"/>
+                  </a:schemeClr>
+                </a:solidFill>
+              </a:rPr>
+              <a:t>cpu</a:t>
+            </a:r>
+            <a:r>
+              <a:rPr lang="en-US" dirty="0" smtClean="0">
+                <a:solidFill>
+                  <a:schemeClr val="accent1">
+                    <a:lumMod val="40000"/>
+                    <a:lumOff val="60000"/>
+                  </a:schemeClr>
+                </a:solidFill>
+              </a:rPr>
+              <a:t> 1. H signifies it’s a high priority pool worker.</a:t>
+            </a:r>
+            <a:endParaRPr lang="en-US" dirty="0" smtClean="0">
+              <a:solidFill>
+                <a:schemeClr val="accent1">
+                  <a:lumMod val="40000"/>
+                  <a:lumOff val="60000"/>
+                </a:schemeClr>
+              </a:solidFill>
+            </a:endParaRPr>
+          </a:p>
+          <a:p>
+            <a:pPr lvl="1">
+              <a:buFont typeface="Arial" panose="020B0604020202020204" pitchFamily="34" charset="0"/>
+              <a:buChar char="•"/>
+            </a:pPr>
+            <a:r>
+              <a:rPr lang="en-US" dirty="0" err="1" smtClean="0">
+                <a:solidFill>
+                  <a:schemeClr val="accent1">
+                    <a:lumMod val="40000"/>
+                    <a:lumOff val="60000"/>
+                  </a:schemeClr>
+                </a:solidFill>
+              </a:rPr>
+              <a:t>Kworker</a:t>
+            </a:r>
+            <a:r>
+              <a:rPr lang="en-US" dirty="0" smtClean="0">
+                <a:solidFill>
+                  <a:schemeClr val="accent1">
+                    <a:lumMod val="40000"/>
+                    <a:lumOff val="60000"/>
+                  </a:schemeClr>
+                </a:solidFill>
+              </a:rPr>
+              <a:t>/u4:1</a:t>
+            </a:r>
+          </a:p>
+          <a:p>
+            <a:pPr lvl="2">
+              <a:buFont typeface="Arial" panose="020B0604020202020204" pitchFamily="34" charset="0"/>
+              <a:buChar char="•"/>
+            </a:pPr>
+            <a:r>
+              <a:rPr lang="en-US" dirty="0" smtClean="0">
+                <a:solidFill>
+                  <a:schemeClr val="accent1">
+                    <a:lumMod val="40000"/>
+                    <a:lumOff val="60000"/>
+                  </a:schemeClr>
+                </a:solidFill>
+              </a:rPr>
+              <a:t>Is an unbounded worker. Here 4 signifies the worker pool number and not the </a:t>
+            </a:r>
+            <a:r>
+              <a:rPr lang="en-US" dirty="0" err="1" smtClean="0">
+                <a:solidFill>
+                  <a:schemeClr val="accent1">
+                    <a:lumMod val="40000"/>
+                    <a:lumOff val="60000"/>
+                  </a:schemeClr>
+                </a:solidFill>
+              </a:rPr>
+              <a:t>cpu</a:t>
+            </a:r>
+            <a:r>
+              <a:rPr lang="en-US" dirty="0" smtClean="0">
+                <a:solidFill>
+                  <a:schemeClr val="accent1">
+                    <a:lumMod val="40000"/>
+                    <a:lumOff val="60000"/>
+                  </a:schemeClr>
+                </a:solidFill>
+              </a:rPr>
+              <a:t> number. How come 4? Each core will have two pools(normal and high priority pools) of </a:t>
+            </a:r>
+            <a:r>
+              <a:rPr lang="en-US" dirty="0" err="1" smtClean="0">
+                <a:solidFill>
+                  <a:schemeClr val="accent1">
+                    <a:lumMod val="40000"/>
+                    <a:lumOff val="60000"/>
+                  </a:schemeClr>
+                </a:solidFill>
+              </a:rPr>
+              <a:t>kworkers</a:t>
+            </a:r>
+            <a:r>
+              <a:rPr lang="en-US" dirty="0" smtClean="0">
+                <a:solidFill>
+                  <a:schemeClr val="accent1">
+                    <a:lumMod val="40000"/>
+                    <a:lumOff val="60000"/>
+                  </a:schemeClr>
+                </a:solidFill>
+              </a:rPr>
+              <a:t>. Since this is a dual core system, 0 – 3 pool ids are used for bounded worker pools. And 4 and 5 will be used by unbounded worker pools.</a:t>
+            </a:r>
             <a:endParaRPr lang="en-US" dirty="0" smtClean="0">
               <a:solidFill>
                 <a:schemeClr val="accent1">
@@ -18686,7 +19450,7 @@
         </p:blipFill>
         <p:spPr bwMode="auto">
           <a:xfrm>
-            <a:off x="1833563" y="1971675"/>
+            <a:off x="1723395" y="924997"/>
             <a:ext cx="5476875" cy="2914650"/>
           </a:xfrm>
           <a:prstGeom prst="rect">
@@ -19891,7 +20655,7 @@
         <p:spPr>
           <a:xfrm>
             <a:off x="384047" y="1369377"/>
-            <a:ext cx="8458200" cy="5015219"/>
+            <a:ext cx="8458200" cy="5330690"/>
           </a:xfrm>
         </p:spPr>
         <p:txBody>
@@ -20031,8 +20795,41 @@
                   </a:schemeClr>
                 </a:solidFill>
               </a:rPr>
-              <a:t>Assume you have 4 processor cores.</a:t>
-            </a:r>
+              <a:t>Assume you have 4 processor cores</a:t>
+            </a:r>
+            <a:r>
+              <a:rPr lang="en-US" dirty="0" smtClean="0">
+                <a:solidFill>
+                  <a:schemeClr val="accent1">
+                    <a:lumMod val="40000"/>
+                    <a:lumOff val="60000"/>
+                  </a:schemeClr>
+                </a:solidFill>
+              </a:rPr>
+              <a:t>.</a:t>
+            </a:r>
+          </a:p>
+          <a:p>
+            <a:pPr lvl="1"/>
+            <a:r>
+              <a:rPr lang="en-US" dirty="0" smtClean="0">
+                <a:solidFill>
+                  <a:schemeClr val="accent1">
+                    <a:lumMod val="40000"/>
+                    <a:lumOff val="60000"/>
+                  </a:schemeClr>
+                </a:solidFill>
+              </a:rPr>
+              <a:t>It creates 4 falcon threads.</a:t>
+            </a:r>
+            <a:endParaRPr lang="en-US" dirty="0">
+              <a:solidFill>
+                <a:schemeClr val="accent1">
+                  <a:lumMod val="40000"/>
+                  <a:lumOff val="60000"/>
+                </a:schemeClr>
+              </a:solidFill>
+            </a:endParaRPr>
           </a:p>
           <a:p>
             <a:r>
@@ -20493,33 +21290,15 @@
                                   </p:childTnLst>
                                 </p:cTn>
                               </p:par>
-                            </p:childTnLst>
-                          </p:cTn>
-                        </p:par>
-                      </p:childTnLst>
-                    </p:cTn>
-                  </p:par>
-                  <p:par>
-                    <p:cTn id="27" fill="hold">
-                      <p:stCondLst>
-                        <p:cond delay="indefinite"/>
-                      </p:stCondLst>
-                      <p:childTnLst>
-                        <p:par>
-                          <p:cTn id="28" fill="hold">
-                            <p:stCondLst>
-                              <p:cond delay="0"/>
-                            </p:stCondLst>
-                            <p:childTnLst>
                               <p:par>
-                                <p:cTn id="29" presetID="1" presetClass="entr" presetSubtype="0" fill="hold" nodeType="clickEffect">
+                                <p:cTn id="27" presetID="1" presetClass="entr" presetSubtype="0" fill="hold" nodeType="withEffect">
                                   <p:stCondLst>
                                     <p:cond delay="0"/>
                                   </p:stCondLst>
                                   <p:childTnLst>
                                     <p:set>
                                       <p:cBhvr>
-                                        <p:cTn id="30" dur="1" fill="hold">
+                                        <p:cTn id="28" dur="1" fill="hold">
                                           <p:stCondLst>
                                             <p:cond delay="0"/>
                                           </p:stCondLst>
@@ -20528,6 +21307,55 @@
                                           <p:spTgt spid="3">
                                             <p:txEl>
                                               <p:pRg st="7" end="7"/>
+                                            </p:txEl>
+                                          </p:spTgt>
+                                        </p:tgtEl>
+                                        <p:attrNameLst>
+                                          <p:attrName>style.visibility</p:attrName>
+                                        </p:attrNameLst>
+                                      </p:cBhvr>
+                                      <p:to>
+                                        <p:strVal val="visible"/>
+                                      </p:to>
+                                    </p:set>
+                                  </p:childTnLst>
+                                </p:cTn>
+                              </p:par>
+                            </p:childTnLst>
+                          </p:cTn>
+                        </p:par>
+                      </p:childTnLst>
+                    </p:cTn>
+                  </p:par>
+                  <p:par>
+                    <p:cTn id="29" fill="hold">
+                      <p:stCondLst>
+                        <p:cond delay="indefinite"/>
+                      </p:stCondLst>
+                      <p:childTnLst>
+                        <p:par>
+                          <p:cTn id="30" fill="hold">
+                            <p:stCondLst>
+                              <p:cond delay="0"/>
+                            </p:stCondLst>
+                            <p:childTnLst>
+                              <p:par>
+                                <p:cTn id="31" presetID="1" presetClass="entr" presetSubtype="0" fill="hold" nodeType="clickEffect">
+                                  <p:stCondLst>
+                                    <p:cond delay="0"/>
+                                  </p:stCondLst>
+                                  <p:childTnLst>
+                                    <p:set>
+                                      <p:cBhvr>
+                                        <p:cTn id="32" dur="1" fill="hold">
+                                          <p:stCondLst>
+                                            <p:cond delay="0"/>
+                                          </p:stCondLst>
+                                        </p:cTn>
+                                        <p:tgtEl>
+                                          <p:spTgt spid="3">
+                                            <p:txEl>
+                                              <p:pRg st="8" end="8"/>
                                             </p:txEl>
                                           </p:spTgt>
                                         </p:tgtEl>

</xml_diff>